<commit_message>
Number of season concerts must not be 12
</commit_message>
<xml_diff>
--- a/Description/FlyerPictures.pptx
+++ b/Description/FlyerPictures.pptx
@@ -267,7 +267,7 @@
           <a:p>
             <a:fld id="{9B1BEB43-7884-4A88-BD85-8E31F890BB75}" type="datetimeFigureOut">
               <a:rPr lang="de-CH" smtClean="0"/>
-              <a:t>07.06.2023</a:t>
+              <a:t>23.09.2023</a:t>
             </a:fld>
             <a:endParaRPr lang="de-CH"/>
           </a:p>
@@ -467,7 +467,7 @@
           <a:p>
             <a:fld id="{9B1BEB43-7884-4A88-BD85-8E31F890BB75}" type="datetimeFigureOut">
               <a:rPr lang="de-CH" smtClean="0"/>
-              <a:t>07.06.2023</a:t>
+              <a:t>23.09.2023</a:t>
             </a:fld>
             <a:endParaRPr lang="de-CH"/>
           </a:p>
@@ -677,7 +677,7 @@
           <a:p>
             <a:fld id="{9B1BEB43-7884-4A88-BD85-8E31F890BB75}" type="datetimeFigureOut">
               <a:rPr lang="de-CH" smtClean="0"/>
-              <a:t>07.06.2023</a:t>
+              <a:t>23.09.2023</a:t>
             </a:fld>
             <a:endParaRPr lang="de-CH"/>
           </a:p>
@@ -877,7 +877,7 @@
           <a:p>
             <a:fld id="{9B1BEB43-7884-4A88-BD85-8E31F890BB75}" type="datetimeFigureOut">
               <a:rPr lang="de-CH" smtClean="0"/>
-              <a:t>07.06.2023</a:t>
+              <a:t>23.09.2023</a:t>
             </a:fld>
             <a:endParaRPr lang="de-CH"/>
           </a:p>
@@ -1153,7 +1153,7 @@
           <a:p>
             <a:fld id="{9B1BEB43-7884-4A88-BD85-8E31F890BB75}" type="datetimeFigureOut">
               <a:rPr lang="de-CH" smtClean="0"/>
-              <a:t>07.06.2023</a:t>
+              <a:t>23.09.2023</a:t>
             </a:fld>
             <a:endParaRPr lang="de-CH"/>
           </a:p>
@@ -1421,7 +1421,7 @@
           <a:p>
             <a:fld id="{9B1BEB43-7884-4A88-BD85-8E31F890BB75}" type="datetimeFigureOut">
               <a:rPr lang="de-CH" smtClean="0"/>
-              <a:t>07.06.2023</a:t>
+              <a:t>23.09.2023</a:t>
             </a:fld>
             <a:endParaRPr lang="de-CH"/>
           </a:p>
@@ -1836,7 +1836,7 @@
           <a:p>
             <a:fld id="{9B1BEB43-7884-4A88-BD85-8E31F890BB75}" type="datetimeFigureOut">
               <a:rPr lang="de-CH" smtClean="0"/>
-              <a:t>07.06.2023</a:t>
+              <a:t>23.09.2023</a:t>
             </a:fld>
             <a:endParaRPr lang="de-CH"/>
           </a:p>
@@ -1978,7 +1978,7 @@
           <a:p>
             <a:fld id="{9B1BEB43-7884-4A88-BD85-8E31F890BB75}" type="datetimeFigureOut">
               <a:rPr lang="de-CH" smtClean="0"/>
-              <a:t>07.06.2023</a:t>
+              <a:t>23.09.2023</a:t>
             </a:fld>
             <a:endParaRPr lang="de-CH"/>
           </a:p>
@@ -2091,7 +2091,7 @@
           <a:p>
             <a:fld id="{9B1BEB43-7884-4A88-BD85-8E31F890BB75}" type="datetimeFigureOut">
               <a:rPr lang="de-CH" smtClean="0"/>
-              <a:t>07.06.2023</a:t>
+              <a:t>23.09.2023</a:t>
             </a:fld>
             <a:endParaRPr lang="de-CH"/>
           </a:p>
@@ -2404,7 +2404,7 @@
           <a:p>
             <a:fld id="{9B1BEB43-7884-4A88-BD85-8E31F890BB75}" type="datetimeFigureOut">
               <a:rPr lang="de-CH" smtClean="0"/>
-              <a:t>07.06.2023</a:t>
+              <a:t>23.09.2023</a:t>
             </a:fld>
             <a:endParaRPr lang="de-CH"/>
           </a:p>
@@ -2693,7 +2693,7 @@
           <a:p>
             <a:fld id="{9B1BEB43-7884-4A88-BD85-8E31F890BB75}" type="datetimeFigureOut">
               <a:rPr lang="de-CH" smtClean="0"/>
-              <a:t>07.06.2023</a:t>
+              <a:t>23.09.2023</a:t>
             </a:fld>
             <a:endParaRPr lang="de-CH"/>
           </a:p>
@@ -2936,7 +2936,7 @@
           <a:p>
             <a:fld id="{9B1BEB43-7884-4A88-BD85-8E31F890BB75}" type="datetimeFigureOut">
               <a:rPr lang="de-CH" smtClean="0"/>
-              <a:t>07.06.2023</a:t>
+              <a:t>23.09.2023</a:t>
             </a:fld>
             <a:endParaRPr lang="de-CH"/>
           </a:p>
@@ -10145,6 +10145,1017 @@
           <a:chExt cx="0" cy="0"/>
         </a:xfrm>
       </p:grpSpPr>
+      <p:sp>
+        <p:nvSpPr>
+          <p:cNvPr id="2" name="Rechteck 1">
+            <a:extLst>
+              <a:ext uri="{FF2B5EF4-FFF2-40B4-BE49-F238E27FC236}">
+                <a16:creationId xmlns:a16="http://schemas.microsoft.com/office/drawing/2014/main" id="{21400545-493F-81E0-9CC6-D6264CDFB95D}"/>
+              </a:ext>
+            </a:extLst>
+          </p:cNvPr>
+          <p:cNvSpPr/>
+          <p:nvPr/>
+        </p:nvSpPr>
+        <p:spPr>
+          <a:xfrm>
+            <a:off x="3318933" y="438737"/>
+            <a:ext cx="2633132" cy="374063"/>
+          </a:xfrm>
+          <a:prstGeom prst="rect">
+            <a:avLst/>
+          </a:prstGeom>
+          <a:noFill/>
+          <a:ln>
+            <a:solidFill>
+              <a:schemeClr val="tx1"/>
+            </a:solidFill>
+          </a:ln>
+        </p:spPr>
+        <p:style>
+          <a:lnRef idx="2">
+            <a:schemeClr val="accent1">
+              <a:shade val="50000"/>
+            </a:schemeClr>
+          </a:lnRef>
+          <a:fillRef idx="1">
+            <a:schemeClr val="accent1"/>
+          </a:fillRef>
+          <a:effectRef idx="0">
+            <a:schemeClr val="accent1"/>
+          </a:effectRef>
+          <a:fontRef idx="minor">
+            <a:schemeClr val="lt1"/>
+          </a:fontRef>
+        </p:style>
+        <p:txBody>
+          <a:bodyPr rtlCol="0" anchor="ctr"/>
+          <a:lstStyle/>
+          <a:p>
+            <a:pPr algn="ctr"/>
+            <a:r>
+              <a:rPr lang="de-CH" sz="1400" b="0" dirty="0">
+                <a:solidFill>
+                  <a:srgbClr val="CCCCCC"/>
+                </a:solidFill>
+                <a:effectLst/>
+                <a:latin typeface="Consolas" panose="020B0609020204030204" pitchFamily="49" charset="0"/>
+              </a:rPr>
+              <a:t> </a:t>
+            </a:r>
+            <a:r>
+              <a:rPr lang="de-CH" sz="1000" b="1" dirty="0" err="1">
+                <a:solidFill>
+                  <a:schemeClr val="tx1"/>
+                </a:solidFill>
+                <a:effectLst/>
+                <a:latin typeface="Arial" panose="020B0604020202020204" pitchFamily="34" charset="0"/>
+                <a:cs typeface="Arial" panose="020B0604020202020204" pitchFamily="34" charset="0"/>
+              </a:rPr>
+              <a:t>eventSelectLoginDropDown</a:t>
+            </a:r>
+            <a:endParaRPr lang="de-CH" sz="1000" b="1" dirty="0">
+              <a:solidFill>
+                <a:schemeClr val="tx1"/>
+              </a:solidFill>
+              <a:effectLst/>
+              <a:latin typeface="Arial" panose="020B0604020202020204" pitchFamily="34" charset="0"/>
+              <a:cs typeface="Arial" panose="020B0604020202020204" pitchFamily="34" charset="0"/>
+            </a:endParaRPr>
+          </a:p>
+          <a:p>
+            <a:pPr algn="ctr"/>
+            <a:r>
+              <a:rPr lang="de-CH" sz="800" b="1" dirty="0">
+                <a:solidFill>
+                  <a:schemeClr val="tx1"/>
+                </a:solidFill>
+                <a:latin typeface="Arial" panose="020B0604020202020204" pitchFamily="34" charset="0"/>
+                <a:cs typeface="Arial" panose="020B0604020202020204" pitchFamily="34" charset="0"/>
+              </a:rPr>
+              <a:t>User Login</a:t>
+            </a:r>
+            <a:endParaRPr lang="de-CH" sz="800" b="1" dirty="0">
+              <a:solidFill>
+                <a:schemeClr val="tx1"/>
+              </a:solidFill>
+              <a:effectLst/>
+              <a:latin typeface="Arial" panose="020B0604020202020204" pitchFamily="34" charset="0"/>
+              <a:cs typeface="Arial" panose="020B0604020202020204" pitchFamily="34" charset="0"/>
+            </a:endParaRPr>
+          </a:p>
+        </p:txBody>
+      </p:sp>
+      <p:sp>
+        <p:nvSpPr>
+          <p:cNvPr id="3" name="Textfeld 2">
+            <a:extLst>
+              <a:ext uri="{FF2B5EF4-FFF2-40B4-BE49-F238E27FC236}">
+                <a16:creationId xmlns:a16="http://schemas.microsoft.com/office/drawing/2014/main" id="{D6B6A80E-F093-C0E5-8526-023E3DC52F3A}"/>
+              </a:ext>
+            </a:extLst>
+          </p:cNvPr>
+          <p:cNvSpPr txBox="1"/>
+          <p:nvPr/>
+        </p:nvSpPr>
+        <p:spPr>
+          <a:xfrm>
+            <a:off x="770471" y="438737"/>
+            <a:ext cx="1358639" cy="215444"/>
+          </a:xfrm>
+          <a:prstGeom prst="rect">
+            <a:avLst/>
+          </a:prstGeom>
+          <a:noFill/>
+        </p:spPr>
+        <p:txBody>
+          <a:bodyPr wrap="square" rtlCol="0">
+            <a:spAutoFit/>
+          </a:bodyPr>
+          <a:lstStyle/>
+          <a:p>
+            <a:r>
+              <a:rPr lang="fr-FR" sz="800" b="1" dirty="0">
+                <a:latin typeface="Arial" panose="020B0604020202020204" pitchFamily="34" charset="0"/>
+                <a:cs typeface="Arial" panose="020B0604020202020204" pitchFamily="34" charset="0"/>
+              </a:rPr>
+              <a:t>Startup Flyer</a:t>
+            </a:r>
+            <a:endParaRPr lang="de-CH" sz="800" b="1" dirty="0">
+              <a:latin typeface="Arial" panose="020B0604020202020204" pitchFamily="34" charset="0"/>
+              <a:cs typeface="Arial" panose="020B0604020202020204" pitchFamily="34" charset="0"/>
+            </a:endParaRPr>
+          </a:p>
+        </p:txBody>
+      </p:sp>
+      <p:sp>
+        <p:nvSpPr>
+          <p:cNvPr id="4" name="Rechteck 3">
+            <a:extLst>
+              <a:ext uri="{FF2B5EF4-FFF2-40B4-BE49-F238E27FC236}">
+                <a16:creationId xmlns:a16="http://schemas.microsoft.com/office/drawing/2014/main" id="{D6385F4F-B43E-B2CC-76C8-7103CB97F679}"/>
+              </a:ext>
+            </a:extLst>
+          </p:cNvPr>
+          <p:cNvSpPr/>
+          <p:nvPr/>
+        </p:nvSpPr>
+        <p:spPr>
+          <a:xfrm>
+            <a:off x="3318933" y="1031403"/>
+            <a:ext cx="2633132" cy="711200"/>
+          </a:xfrm>
+          <a:prstGeom prst="rect">
+            <a:avLst/>
+          </a:prstGeom>
+          <a:noFill/>
+          <a:ln>
+            <a:solidFill>
+              <a:schemeClr val="tx1"/>
+            </a:solidFill>
+          </a:ln>
+        </p:spPr>
+        <p:style>
+          <a:lnRef idx="2">
+            <a:schemeClr val="accent1">
+              <a:shade val="50000"/>
+            </a:schemeClr>
+          </a:lnRef>
+          <a:fillRef idx="1">
+            <a:schemeClr val="accent1"/>
+          </a:fillRef>
+          <a:effectRef idx="0">
+            <a:schemeClr val="accent1"/>
+          </a:effectRef>
+          <a:fontRef idx="minor">
+            <a:schemeClr val="lt1"/>
+          </a:fontRef>
+        </p:style>
+        <p:txBody>
+          <a:bodyPr rtlCol="0" anchor="ctr"/>
+          <a:lstStyle/>
+          <a:p>
+            <a:pPr algn="ctr"/>
+            <a:r>
+              <a:rPr lang="de-CH" sz="1400" b="0" dirty="0">
+                <a:solidFill>
+                  <a:srgbClr val="CCCCCC"/>
+                </a:solidFill>
+                <a:effectLst/>
+                <a:latin typeface="Consolas" panose="020B0609020204030204" pitchFamily="49" charset="0"/>
+              </a:rPr>
+              <a:t> </a:t>
+            </a:r>
+            <a:r>
+              <a:rPr lang="de-CH" sz="1000" b="1" dirty="0" err="1">
+                <a:solidFill>
+                  <a:schemeClr val="tx1"/>
+                </a:solidFill>
+                <a:effectLst/>
+                <a:latin typeface="Arial" panose="020B0604020202020204" pitchFamily="34" charset="0"/>
+                <a:cs typeface="Arial" panose="020B0604020202020204" pitchFamily="34" charset="0"/>
+              </a:rPr>
+              <a:t>setGlobalParametersLoadXml</a:t>
+            </a:r>
+            <a:endParaRPr lang="de-CH" sz="1000" b="1" dirty="0">
+              <a:solidFill>
+                <a:schemeClr val="tx1"/>
+              </a:solidFill>
+              <a:effectLst/>
+              <a:latin typeface="Arial" panose="020B0604020202020204" pitchFamily="34" charset="0"/>
+              <a:cs typeface="Arial" panose="020B0604020202020204" pitchFamily="34" charset="0"/>
+            </a:endParaRPr>
+          </a:p>
+          <a:p>
+            <a:pPr algn="ctr"/>
+            <a:r>
+              <a:rPr lang="de-CH" sz="800" b="1" dirty="0" err="1">
+                <a:solidFill>
+                  <a:schemeClr val="tx1"/>
+                </a:solidFill>
+                <a:latin typeface="Arial" panose="020B0604020202020204" pitchFamily="34" charset="0"/>
+                <a:cs typeface="Arial" panose="020B0604020202020204" pitchFamily="34" charset="0"/>
+              </a:rPr>
+              <a:t>displayPagePrintOne</a:t>
+            </a:r>
+            <a:endParaRPr lang="de-CH" sz="800" b="1" dirty="0">
+              <a:solidFill>
+                <a:schemeClr val="tx1"/>
+              </a:solidFill>
+              <a:latin typeface="Arial" panose="020B0604020202020204" pitchFamily="34" charset="0"/>
+              <a:cs typeface="Arial" panose="020B0604020202020204" pitchFamily="34" charset="0"/>
+            </a:endParaRPr>
+          </a:p>
+          <a:p>
+            <a:pPr algn="ctr"/>
+            <a:r>
+              <a:rPr lang="de-CH" sz="800" b="1" dirty="0" err="1">
+                <a:solidFill>
+                  <a:schemeClr val="tx1"/>
+                </a:solidFill>
+                <a:latin typeface="Arial" panose="020B0604020202020204" pitchFamily="34" charset="0"/>
+                <a:cs typeface="Arial" panose="020B0604020202020204" pitchFamily="34" charset="0"/>
+              </a:rPr>
+              <a:t>displayPagePrintTwo</a:t>
+            </a:r>
+            <a:endParaRPr lang="de-CH" sz="800" b="1" dirty="0">
+              <a:solidFill>
+                <a:schemeClr val="tx1"/>
+              </a:solidFill>
+              <a:latin typeface="Arial" panose="020B0604020202020204" pitchFamily="34" charset="0"/>
+              <a:cs typeface="Arial" panose="020B0604020202020204" pitchFamily="34" charset="0"/>
+            </a:endParaRPr>
+          </a:p>
+          <a:p>
+            <a:pPr algn="ctr"/>
+            <a:r>
+              <a:rPr lang="de-CH" sz="800" b="1" dirty="0" err="1">
+                <a:solidFill>
+                  <a:schemeClr val="tx1"/>
+                </a:solidFill>
+                <a:latin typeface="Arial" panose="020B0604020202020204" pitchFamily="34" charset="0"/>
+                <a:cs typeface="Arial" panose="020B0604020202020204" pitchFamily="34" charset="0"/>
+              </a:rPr>
+              <a:t>g_user_case_str</a:t>
+            </a:r>
+            <a:endParaRPr lang="de-CH" sz="800" b="1" dirty="0">
+              <a:solidFill>
+                <a:schemeClr val="tx1"/>
+              </a:solidFill>
+              <a:latin typeface="Arial" panose="020B0604020202020204" pitchFamily="34" charset="0"/>
+              <a:cs typeface="Arial" panose="020B0604020202020204" pitchFamily="34" charset="0"/>
+            </a:endParaRPr>
+          </a:p>
+        </p:txBody>
+      </p:sp>
+      <p:sp>
+        <p:nvSpPr>
+          <p:cNvPr id="5" name="Textfeld 4">
+            <a:extLst>
+              <a:ext uri="{FF2B5EF4-FFF2-40B4-BE49-F238E27FC236}">
+                <a16:creationId xmlns:a16="http://schemas.microsoft.com/office/drawing/2014/main" id="{F43D8D4E-B26D-2E14-4ED6-19D3047153A1}"/>
+              </a:ext>
+            </a:extLst>
+          </p:cNvPr>
+          <p:cNvSpPr txBox="1"/>
+          <p:nvPr/>
+        </p:nvSpPr>
+        <p:spPr>
+          <a:xfrm>
+            <a:off x="6392337" y="1140346"/>
+            <a:ext cx="3471329" cy="461665"/>
+          </a:xfrm>
+          <a:prstGeom prst="rect">
+            <a:avLst/>
+          </a:prstGeom>
+          <a:noFill/>
+        </p:spPr>
+        <p:txBody>
+          <a:bodyPr wrap="square" rtlCol="0">
+            <a:spAutoFit/>
+          </a:bodyPr>
+          <a:lstStyle/>
+          <a:p>
+            <a:r>
+              <a:rPr lang="fr-FR" sz="800" b="1" dirty="0">
+                <a:latin typeface="Arial" panose="020B0604020202020204" pitchFamily="34" charset="0"/>
+                <a:cs typeface="Arial" panose="020B0604020202020204" pitchFamily="34" charset="0"/>
+              </a:rPr>
+              <a:t>Global variables</a:t>
+            </a:r>
+          </a:p>
+          <a:p>
+            <a:r>
+              <a:rPr lang="fr-FR" sz="800" b="1" dirty="0" err="1">
+                <a:latin typeface="Arial" panose="020B0604020202020204" pitchFamily="34" charset="0"/>
+                <a:cs typeface="Arial" panose="020B0604020202020204" pitchFamily="34" charset="0"/>
+              </a:rPr>
+              <a:t>g_user_case_str</a:t>
+            </a:r>
+            <a:r>
+              <a:rPr lang="fr-FR" sz="800" b="1" dirty="0">
+                <a:latin typeface="Arial" panose="020B0604020202020204" pitchFamily="34" charset="0"/>
+                <a:cs typeface="Arial" panose="020B0604020202020204" pitchFamily="34" charset="0"/>
+              </a:rPr>
+              <a:t> = admin, printer, tester or concert </a:t>
+            </a:r>
+            <a:r>
+              <a:rPr lang="fr-FR" sz="800" b="1" dirty="0" err="1">
+                <a:latin typeface="Arial" panose="020B0604020202020204" pitchFamily="34" charset="0"/>
+                <a:cs typeface="Arial" panose="020B0604020202020204" pitchFamily="34" charset="0"/>
+              </a:rPr>
+              <a:t>number</a:t>
+            </a:r>
+            <a:endParaRPr lang="fr-FR" sz="800" b="1" dirty="0">
+              <a:latin typeface="Arial" panose="020B0604020202020204" pitchFamily="34" charset="0"/>
+              <a:cs typeface="Arial" panose="020B0604020202020204" pitchFamily="34" charset="0"/>
+            </a:endParaRPr>
+          </a:p>
+          <a:p>
+            <a:endParaRPr lang="fr-FR" sz="800" b="1" dirty="0">
+              <a:latin typeface="Arial" panose="020B0604020202020204" pitchFamily="34" charset="0"/>
+              <a:cs typeface="Arial" panose="020B0604020202020204" pitchFamily="34" charset="0"/>
+            </a:endParaRPr>
+          </a:p>
+        </p:txBody>
+      </p:sp>
+      <p:sp>
+        <p:nvSpPr>
+          <p:cNvPr id="6" name="Rechteck 5">
+            <a:extLst>
+              <a:ext uri="{FF2B5EF4-FFF2-40B4-BE49-F238E27FC236}">
+                <a16:creationId xmlns:a16="http://schemas.microsoft.com/office/drawing/2014/main" id="{E6E8F709-288E-5D0B-1A7B-F3F90E10BD54}"/>
+              </a:ext>
+            </a:extLst>
+          </p:cNvPr>
+          <p:cNvSpPr/>
+          <p:nvPr/>
+        </p:nvSpPr>
+        <p:spPr>
+          <a:xfrm>
+            <a:off x="3318933" y="1883195"/>
+            <a:ext cx="2633132" cy="453605"/>
+          </a:xfrm>
+          <a:prstGeom prst="rect">
+            <a:avLst/>
+          </a:prstGeom>
+          <a:noFill/>
+          <a:ln>
+            <a:solidFill>
+              <a:schemeClr val="tx1"/>
+            </a:solidFill>
+          </a:ln>
+        </p:spPr>
+        <p:style>
+          <a:lnRef idx="2">
+            <a:schemeClr val="accent1">
+              <a:shade val="50000"/>
+            </a:schemeClr>
+          </a:lnRef>
+          <a:fillRef idx="1">
+            <a:schemeClr val="accent1"/>
+          </a:fillRef>
+          <a:effectRef idx="0">
+            <a:schemeClr val="accent1"/>
+          </a:effectRef>
+          <a:fontRef idx="minor">
+            <a:schemeClr val="lt1"/>
+          </a:fontRef>
+        </p:style>
+        <p:txBody>
+          <a:bodyPr rtlCol="0" anchor="ctr"/>
+          <a:lstStyle/>
+          <a:p>
+            <a:pPr algn="ctr"/>
+            <a:r>
+              <a:rPr lang="de-CH" sz="1400" b="0" dirty="0">
+                <a:solidFill>
+                  <a:srgbClr val="CCCCCC"/>
+                </a:solidFill>
+                <a:effectLst/>
+                <a:latin typeface="Consolas" panose="020B0609020204030204" pitchFamily="49" charset="0"/>
+              </a:rPr>
+              <a:t> </a:t>
+            </a:r>
+            <a:r>
+              <a:rPr lang="de-CH" sz="1000" b="1" dirty="0" err="1">
+                <a:solidFill>
+                  <a:schemeClr val="tx1"/>
+                </a:solidFill>
+                <a:latin typeface="Arial" panose="020B0604020202020204" pitchFamily="34" charset="0"/>
+                <a:cs typeface="Arial" panose="020B0604020202020204" pitchFamily="34" charset="0"/>
+              </a:rPr>
+              <a:t>loadSubdirNames</a:t>
+            </a:r>
+            <a:endParaRPr lang="de-CH" sz="1000" b="1" dirty="0">
+              <a:solidFill>
+                <a:schemeClr val="tx1"/>
+              </a:solidFill>
+              <a:effectLst/>
+              <a:latin typeface="Arial" panose="020B0604020202020204" pitchFamily="34" charset="0"/>
+              <a:cs typeface="Arial" panose="020B0604020202020204" pitchFamily="34" charset="0"/>
+            </a:endParaRPr>
+          </a:p>
+          <a:p>
+            <a:pPr algn="ctr"/>
+            <a:r>
+              <a:rPr lang="de-CH" sz="800" b="1" dirty="0" err="1">
+                <a:solidFill>
+                  <a:schemeClr val="tx1"/>
+                </a:solidFill>
+                <a:latin typeface="Arial" panose="020B0604020202020204" pitchFamily="34" charset="0"/>
+                <a:cs typeface="Arial" panose="020B0604020202020204" pitchFamily="34" charset="0"/>
+              </a:rPr>
+              <a:t>g_subdirectory_names_xml</a:t>
+            </a:r>
+            <a:endParaRPr lang="de-CH" sz="1000" b="1" dirty="0">
+              <a:solidFill>
+                <a:schemeClr val="tx1"/>
+              </a:solidFill>
+              <a:latin typeface="Arial" panose="020B0604020202020204" pitchFamily="34" charset="0"/>
+              <a:cs typeface="Arial" panose="020B0604020202020204" pitchFamily="34" charset="0"/>
+            </a:endParaRPr>
+          </a:p>
+        </p:txBody>
+      </p:sp>
+      <p:sp>
+        <p:nvSpPr>
+          <p:cNvPr id="7" name="Rechteck 6">
+            <a:extLst>
+              <a:ext uri="{FF2B5EF4-FFF2-40B4-BE49-F238E27FC236}">
+                <a16:creationId xmlns:a16="http://schemas.microsoft.com/office/drawing/2014/main" id="{7A51E8C1-DE84-04C5-549A-0E072D51C89E}"/>
+              </a:ext>
+            </a:extLst>
+          </p:cNvPr>
+          <p:cNvSpPr/>
+          <p:nvPr/>
+        </p:nvSpPr>
+        <p:spPr>
+          <a:xfrm>
+            <a:off x="3318933" y="2458928"/>
+            <a:ext cx="2633132" cy="453605"/>
+          </a:xfrm>
+          <a:prstGeom prst="rect">
+            <a:avLst/>
+          </a:prstGeom>
+          <a:noFill/>
+          <a:ln>
+            <a:solidFill>
+              <a:schemeClr val="tx1"/>
+            </a:solidFill>
+          </a:ln>
+        </p:spPr>
+        <p:style>
+          <a:lnRef idx="2">
+            <a:schemeClr val="accent1">
+              <a:shade val="50000"/>
+            </a:schemeClr>
+          </a:lnRef>
+          <a:fillRef idx="1">
+            <a:schemeClr val="accent1"/>
+          </a:fillRef>
+          <a:effectRef idx="0">
+            <a:schemeClr val="accent1"/>
+          </a:effectRef>
+          <a:fontRef idx="minor">
+            <a:schemeClr val="lt1"/>
+          </a:fontRef>
+        </p:style>
+        <p:txBody>
+          <a:bodyPr rtlCol="0" anchor="ctr"/>
+          <a:lstStyle/>
+          <a:p>
+            <a:pPr algn="ctr"/>
+            <a:r>
+              <a:rPr lang="de-CH" sz="1400" b="0" dirty="0">
+                <a:solidFill>
+                  <a:srgbClr val="CCCCCC"/>
+                </a:solidFill>
+                <a:effectLst/>
+                <a:latin typeface="Consolas" panose="020B0609020204030204" pitchFamily="49" charset="0"/>
+              </a:rPr>
+              <a:t> </a:t>
+            </a:r>
+            <a:r>
+              <a:rPr lang="de-CH" sz="1000" b="1" dirty="0">
+                <a:solidFill>
+                  <a:schemeClr val="tx1"/>
+                </a:solidFill>
+                <a:latin typeface="Arial" panose="020B0604020202020204" pitchFamily="34" charset="0"/>
+                <a:cs typeface="Arial" panose="020B0604020202020204" pitchFamily="34" charset="0"/>
+              </a:rPr>
+              <a:t> </a:t>
+            </a:r>
+            <a:r>
+              <a:rPr lang="de-CH" sz="1000" b="1" dirty="0" err="1">
+                <a:solidFill>
+                  <a:schemeClr val="tx1"/>
+                </a:solidFill>
+                <a:latin typeface="Arial" panose="020B0604020202020204" pitchFamily="34" charset="0"/>
+                <a:cs typeface="Arial" panose="020B0604020202020204" pitchFamily="34" charset="0"/>
+              </a:rPr>
+              <a:t>afterLoadSubdirNames</a:t>
+            </a:r>
+            <a:endParaRPr lang="de-CH" sz="1000" b="1" dirty="0">
+              <a:solidFill>
+                <a:schemeClr val="tx1"/>
+              </a:solidFill>
+              <a:effectLst/>
+              <a:latin typeface="Arial" panose="020B0604020202020204" pitchFamily="34" charset="0"/>
+              <a:cs typeface="Arial" panose="020B0604020202020204" pitchFamily="34" charset="0"/>
+            </a:endParaRPr>
+          </a:p>
+          <a:p>
+            <a:pPr algn="ctr"/>
+            <a:r>
+              <a:rPr lang="de-CH" sz="800" b="1" dirty="0" err="1">
+                <a:solidFill>
+                  <a:schemeClr val="tx1"/>
+                </a:solidFill>
+                <a:latin typeface="Arial" panose="020B0604020202020204" pitchFamily="34" charset="0"/>
+                <a:cs typeface="Arial" panose="020B0604020202020204" pitchFamily="34" charset="0"/>
+              </a:rPr>
+              <a:t>g_current_season_number</a:t>
+            </a:r>
+            <a:endParaRPr lang="de-CH" sz="1000" b="1" dirty="0">
+              <a:solidFill>
+                <a:schemeClr val="tx1"/>
+              </a:solidFill>
+              <a:latin typeface="Arial" panose="020B0604020202020204" pitchFamily="34" charset="0"/>
+              <a:cs typeface="Arial" panose="020B0604020202020204" pitchFamily="34" charset="0"/>
+            </a:endParaRPr>
+          </a:p>
+        </p:txBody>
+      </p:sp>
+      <p:sp>
+        <p:nvSpPr>
+          <p:cNvPr id="8" name="Rechteck 7">
+            <a:extLst>
+              <a:ext uri="{FF2B5EF4-FFF2-40B4-BE49-F238E27FC236}">
+                <a16:creationId xmlns:a16="http://schemas.microsoft.com/office/drawing/2014/main" id="{02983490-DE8D-C0E3-4C9F-A9514E342121}"/>
+              </a:ext>
+            </a:extLst>
+          </p:cNvPr>
+          <p:cNvSpPr/>
+          <p:nvPr/>
+        </p:nvSpPr>
+        <p:spPr>
+          <a:xfrm>
+            <a:off x="3318933" y="3034662"/>
+            <a:ext cx="2633132" cy="453605"/>
+          </a:xfrm>
+          <a:prstGeom prst="rect">
+            <a:avLst/>
+          </a:prstGeom>
+          <a:noFill/>
+          <a:ln>
+            <a:solidFill>
+              <a:schemeClr val="tx1"/>
+            </a:solidFill>
+          </a:ln>
+        </p:spPr>
+        <p:style>
+          <a:lnRef idx="2">
+            <a:schemeClr val="accent1">
+              <a:shade val="50000"/>
+            </a:schemeClr>
+          </a:lnRef>
+          <a:fillRef idx="1">
+            <a:schemeClr val="accent1"/>
+          </a:fillRef>
+          <a:effectRef idx="0">
+            <a:schemeClr val="accent1"/>
+          </a:effectRef>
+          <a:fontRef idx="minor">
+            <a:schemeClr val="lt1"/>
+          </a:fontRef>
+        </p:style>
+        <p:txBody>
+          <a:bodyPr rtlCol="0" anchor="ctr"/>
+          <a:lstStyle/>
+          <a:p>
+            <a:pPr algn="ctr"/>
+            <a:r>
+              <a:rPr lang="de-CH" sz="1400" b="0" dirty="0">
+                <a:solidFill>
+                  <a:srgbClr val="CCCCCC"/>
+                </a:solidFill>
+                <a:effectLst/>
+                <a:latin typeface="Consolas" panose="020B0609020204030204" pitchFamily="49" charset="0"/>
+              </a:rPr>
+              <a:t> </a:t>
+            </a:r>
+            <a:r>
+              <a:rPr lang="de-CH" sz="1000" b="1" dirty="0">
+                <a:solidFill>
+                  <a:schemeClr val="tx1"/>
+                </a:solidFill>
+                <a:latin typeface="Arial" panose="020B0604020202020204" pitchFamily="34" charset="0"/>
+                <a:cs typeface="Arial" panose="020B0604020202020204" pitchFamily="34" charset="0"/>
+              </a:rPr>
+              <a:t> </a:t>
+            </a:r>
+            <a:r>
+              <a:rPr lang="de-CH" sz="1000" b="1" dirty="0" err="1">
+                <a:solidFill>
+                  <a:schemeClr val="tx1"/>
+                </a:solidFill>
+                <a:latin typeface="Arial" panose="020B0604020202020204" pitchFamily="34" charset="0"/>
+                <a:cs typeface="Arial" panose="020B0604020202020204" pitchFamily="34" charset="0"/>
+              </a:rPr>
+              <a:t>loadApplicationXml</a:t>
+            </a:r>
+            <a:endParaRPr lang="de-CH" sz="1000" b="1" dirty="0">
+              <a:solidFill>
+                <a:schemeClr val="tx1"/>
+              </a:solidFill>
+              <a:effectLst/>
+              <a:latin typeface="Arial" panose="020B0604020202020204" pitchFamily="34" charset="0"/>
+              <a:cs typeface="Arial" panose="020B0604020202020204" pitchFamily="34" charset="0"/>
+            </a:endParaRPr>
+          </a:p>
+          <a:p>
+            <a:pPr algn="ctr"/>
+            <a:r>
+              <a:rPr lang="de-CH" sz="800" b="1" dirty="0" err="1">
+                <a:solidFill>
+                  <a:schemeClr val="tx1"/>
+                </a:solidFill>
+                <a:latin typeface="Arial" panose="020B0604020202020204" pitchFamily="34" charset="0"/>
+                <a:cs typeface="Arial" panose="020B0604020202020204" pitchFamily="34" charset="0"/>
+              </a:rPr>
+              <a:t>g_application_xml</a:t>
+            </a:r>
+            <a:endParaRPr lang="de-CH" sz="1000" b="1" dirty="0">
+              <a:solidFill>
+                <a:schemeClr val="tx1"/>
+              </a:solidFill>
+              <a:latin typeface="Arial" panose="020B0604020202020204" pitchFamily="34" charset="0"/>
+              <a:cs typeface="Arial" panose="020B0604020202020204" pitchFamily="34" charset="0"/>
+            </a:endParaRPr>
+          </a:p>
+        </p:txBody>
+      </p:sp>
+      <p:sp>
+        <p:nvSpPr>
+          <p:cNvPr id="9" name="Rechteck 8">
+            <a:extLst>
+              <a:ext uri="{FF2B5EF4-FFF2-40B4-BE49-F238E27FC236}">
+                <a16:creationId xmlns:a16="http://schemas.microsoft.com/office/drawing/2014/main" id="{01861606-E63F-6947-9938-E5E64EE2442A}"/>
+              </a:ext>
+            </a:extLst>
+          </p:cNvPr>
+          <p:cNvSpPr/>
+          <p:nvPr/>
+        </p:nvSpPr>
+        <p:spPr>
+          <a:xfrm>
+            <a:off x="3318933" y="3551129"/>
+            <a:ext cx="2633132" cy="453605"/>
+          </a:xfrm>
+          <a:prstGeom prst="rect">
+            <a:avLst/>
+          </a:prstGeom>
+          <a:noFill/>
+          <a:ln>
+            <a:solidFill>
+              <a:schemeClr val="tx1"/>
+            </a:solidFill>
+          </a:ln>
+        </p:spPr>
+        <p:style>
+          <a:lnRef idx="2">
+            <a:schemeClr val="accent1">
+              <a:shade val="50000"/>
+            </a:schemeClr>
+          </a:lnRef>
+          <a:fillRef idx="1">
+            <a:schemeClr val="accent1"/>
+          </a:fillRef>
+          <a:effectRef idx="0">
+            <a:schemeClr val="accent1"/>
+          </a:effectRef>
+          <a:fontRef idx="minor">
+            <a:schemeClr val="lt1"/>
+          </a:fontRef>
+        </p:style>
+        <p:txBody>
+          <a:bodyPr rtlCol="0" anchor="ctr"/>
+          <a:lstStyle/>
+          <a:p>
+            <a:pPr algn="ctr"/>
+            <a:r>
+              <a:rPr lang="de-CH" sz="1400" b="0" dirty="0">
+                <a:solidFill>
+                  <a:srgbClr val="CCCCCC"/>
+                </a:solidFill>
+                <a:effectLst/>
+                <a:latin typeface="Consolas" panose="020B0609020204030204" pitchFamily="49" charset="0"/>
+              </a:rPr>
+              <a:t> </a:t>
+            </a:r>
+            <a:r>
+              <a:rPr lang="de-CH" sz="1000" b="1" dirty="0">
+                <a:solidFill>
+                  <a:schemeClr val="tx1"/>
+                </a:solidFill>
+                <a:latin typeface="Arial" panose="020B0604020202020204" pitchFamily="34" charset="0"/>
+                <a:cs typeface="Arial" panose="020B0604020202020204" pitchFamily="34" charset="0"/>
+              </a:rPr>
+              <a:t> </a:t>
+            </a:r>
+            <a:r>
+              <a:rPr lang="de-CH" sz="1000" b="1" dirty="0" err="1">
+                <a:solidFill>
+                  <a:schemeClr val="tx1"/>
+                </a:solidFill>
+                <a:latin typeface="Arial" panose="020B0604020202020204" pitchFamily="34" charset="0"/>
+                <a:cs typeface="Arial" panose="020B0604020202020204" pitchFamily="34" charset="0"/>
+              </a:rPr>
+              <a:t>afterLoadApplicationXml</a:t>
+            </a:r>
+            <a:endParaRPr lang="de-CH" sz="1000" b="1" dirty="0">
+              <a:solidFill>
+                <a:schemeClr val="tx1"/>
+              </a:solidFill>
+              <a:effectLst/>
+              <a:latin typeface="Arial" panose="020B0604020202020204" pitchFamily="34" charset="0"/>
+              <a:cs typeface="Arial" panose="020B0604020202020204" pitchFamily="34" charset="0"/>
+            </a:endParaRPr>
+          </a:p>
+        </p:txBody>
+      </p:sp>
+      <p:sp>
+        <p:nvSpPr>
+          <p:cNvPr id="10" name="Rechteck 9">
+            <a:extLst>
+              <a:ext uri="{FF2B5EF4-FFF2-40B4-BE49-F238E27FC236}">
+                <a16:creationId xmlns:a16="http://schemas.microsoft.com/office/drawing/2014/main" id="{0CE27F75-991B-BCEC-0423-F431DD0C4A28}"/>
+              </a:ext>
+            </a:extLst>
+          </p:cNvPr>
+          <p:cNvSpPr/>
+          <p:nvPr/>
+        </p:nvSpPr>
+        <p:spPr>
+          <a:xfrm>
+            <a:off x="3318933" y="4792385"/>
+            <a:ext cx="2633132" cy="453605"/>
+          </a:xfrm>
+          <a:prstGeom prst="rect">
+            <a:avLst/>
+          </a:prstGeom>
+          <a:noFill/>
+          <a:ln>
+            <a:solidFill>
+              <a:schemeClr val="tx1"/>
+            </a:solidFill>
+          </a:ln>
+        </p:spPr>
+        <p:style>
+          <a:lnRef idx="2">
+            <a:schemeClr val="accent1">
+              <a:shade val="50000"/>
+            </a:schemeClr>
+          </a:lnRef>
+          <a:fillRef idx="1">
+            <a:schemeClr val="accent1"/>
+          </a:fillRef>
+          <a:effectRef idx="0">
+            <a:schemeClr val="accent1"/>
+          </a:effectRef>
+          <a:fontRef idx="minor">
+            <a:schemeClr val="lt1"/>
+          </a:fontRef>
+        </p:style>
+        <p:txBody>
+          <a:bodyPr rtlCol="0" anchor="ctr"/>
+          <a:lstStyle/>
+          <a:p>
+            <a:pPr algn="ctr"/>
+            <a:r>
+              <a:rPr lang="de-CH" sz="1400" b="0" dirty="0">
+                <a:solidFill>
+                  <a:srgbClr val="CCCCCC"/>
+                </a:solidFill>
+                <a:effectLst/>
+                <a:latin typeface="Consolas" panose="020B0609020204030204" pitchFamily="49" charset="0"/>
+              </a:rPr>
+              <a:t> </a:t>
+            </a:r>
+            <a:r>
+              <a:rPr lang="de-CH" sz="1000" b="1" dirty="0">
+                <a:solidFill>
+                  <a:schemeClr val="tx1"/>
+                </a:solidFill>
+                <a:latin typeface="Arial" panose="020B0604020202020204" pitchFamily="34" charset="0"/>
+                <a:cs typeface="Arial" panose="020B0604020202020204" pitchFamily="34" charset="0"/>
+              </a:rPr>
+              <a:t> </a:t>
+            </a:r>
+            <a:r>
+              <a:rPr lang="de-CH" sz="1000" b="1" dirty="0" err="1">
+                <a:solidFill>
+                  <a:schemeClr val="tx1"/>
+                </a:solidFill>
+                <a:latin typeface="Arial" panose="020B0604020202020204" pitchFamily="34" charset="0"/>
+                <a:cs typeface="Arial" panose="020B0604020202020204" pitchFamily="34" charset="0"/>
+              </a:rPr>
+              <a:t>loadXmlEdit</a:t>
+            </a:r>
+            <a:endParaRPr lang="de-CH" sz="1000" b="1" dirty="0">
+              <a:solidFill>
+                <a:schemeClr val="tx1"/>
+              </a:solidFill>
+              <a:effectLst/>
+              <a:latin typeface="Arial" panose="020B0604020202020204" pitchFamily="34" charset="0"/>
+              <a:cs typeface="Arial" panose="020B0604020202020204" pitchFamily="34" charset="0"/>
+            </a:endParaRPr>
+          </a:p>
+        </p:txBody>
+      </p:sp>
+      <p:sp>
+        <p:nvSpPr>
+          <p:cNvPr id="11" name="Rechteck 10">
+            <a:extLst>
+              <a:ext uri="{FF2B5EF4-FFF2-40B4-BE49-F238E27FC236}">
+                <a16:creationId xmlns:a16="http://schemas.microsoft.com/office/drawing/2014/main" id="{47DC5DE3-ADEA-2C16-29E0-7570CE0185AE}"/>
+              </a:ext>
+            </a:extLst>
+          </p:cNvPr>
+          <p:cNvSpPr/>
+          <p:nvPr/>
+        </p:nvSpPr>
+        <p:spPr>
+          <a:xfrm>
+            <a:off x="3318933" y="4077858"/>
+            <a:ext cx="2633132" cy="638075"/>
+          </a:xfrm>
+          <a:prstGeom prst="rect">
+            <a:avLst/>
+          </a:prstGeom>
+          <a:noFill/>
+          <a:ln>
+            <a:solidFill>
+              <a:schemeClr val="tx1"/>
+            </a:solidFill>
+          </a:ln>
+        </p:spPr>
+        <p:style>
+          <a:lnRef idx="2">
+            <a:schemeClr val="accent1">
+              <a:shade val="50000"/>
+            </a:schemeClr>
+          </a:lnRef>
+          <a:fillRef idx="1">
+            <a:schemeClr val="accent1"/>
+          </a:fillRef>
+          <a:effectRef idx="0">
+            <a:schemeClr val="accent1"/>
+          </a:effectRef>
+          <a:fontRef idx="minor">
+            <a:schemeClr val="lt1"/>
+          </a:fontRef>
+        </p:style>
+        <p:txBody>
+          <a:bodyPr rtlCol="0" anchor="ctr"/>
+          <a:lstStyle/>
+          <a:p>
+            <a:pPr algn="ctr"/>
+            <a:r>
+              <a:rPr lang="de-CH" sz="1400" b="0" dirty="0">
+                <a:solidFill>
+                  <a:srgbClr val="CCCCCC"/>
+                </a:solidFill>
+                <a:effectLst/>
+                <a:latin typeface="Consolas" panose="020B0609020204030204" pitchFamily="49" charset="0"/>
+              </a:rPr>
+              <a:t> </a:t>
+            </a:r>
+            <a:r>
+              <a:rPr lang="de-CH" sz="1000" b="1" dirty="0">
+                <a:solidFill>
+                  <a:schemeClr val="tx1"/>
+                </a:solidFill>
+                <a:latin typeface="Arial" panose="020B0604020202020204" pitchFamily="34" charset="0"/>
+                <a:cs typeface="Arial" panose="020B0604020202020204" pitchFamily="34" charset="0"/>
+              </a:rPr>
+              <a:t> </a:t>
+            </a:r>
+            <a:r>
+              <a:rPr lang="de-CH" sz="1000" b="1" dirty="0" err="1">
+                <a:solidFill>
+                  <a:schemeClr val="tx1"/>
+                </a:solidFill>
+                <a:latin typeface="Arial" panose="020B0604020202020204" pitchFamily="34" charset="0"/>
+                <a:cs typeface="Arial" panose="020B0604020202020204" pitchFamily="34" charset="0"/>
+              </a:rPr>
+              <a:t>initLoadSeasonXml</a:t>
+            </a:r>
+            <a:endParaRPr lang="de-CH" sz="1000" b="1" dirty="0">
+              <a:solidFill>
+                <a:schemeClr val="tx1"/>
+              </a:solidFill>
+              <a:effectLst/>
+              <a:latin typeface="Arial" panose="020B0604020202020204" pitchFamily="34" charset="0"/>
+              <a:cs typeface="Arial" panose="020B0604020202020204" pitchFamily="34" charset="0"/>
+            </a:endParaRPr>
+          </a:p>
+          <a:p>
+            <a:pPr algn="ctr"/>
+            <a:r>
+              <a:rPr lang="de-CH" sz="800" b="1" dirty="0" err="1">
+                <a:solidFill>
+                  <a:schemeClr val="tx1"/>
+                </a:solidFill>
+                <a:latin typeface="Arial" panose="020B0604020202020204" pitchFamily="34" charset="0"/>
+                <a:cs typeface="Arial" panose="020B0604020202020204" pitchFamily="34" charset="0"/>
+              </a:rPr>
+              <a:t>g_current_season_xml</a:t>
+            </a:r>
+            <a:r>
+              <a:rPr lang="de-CH" sz="800" b="1" dirty="0">
+                <a:solidFill>
+                  <a:schemeClr val="tx1"/>
+                </a:solidFill>
+                <a:latin typeface="Arial" panose="020B0604020202020204" pitchFamily="34" charset="0"/>
+                <a:cs typeface="Arial" panose="020B0604020202020204" pitchFamily="34" charset="0"/>
+              </a:rPr>
+              <a:t> </a:t>
+            </a:r>
+          </a:p>
+          <a:p>
+            <a:pPr algn="ctr"/>
+            <a:r>
+              <a:rPr lang="de-CH" sz="800" b="1" dirty="0" err="1">
+                <a:solidFill>
+                  <a:schemeClr val="tx1"/>
+                </a:solidFill>
+                <a:latin typeface="Arial" panose="020B0604020202020204" pitchFamily="34" charset="0"/>
+                <a:cs typeface="Arial" panose="020B0604020202020204" pitchFamily="34" charset="0"/>
+              </a:rPr>
+              <a:t>case_load</a:t>
+            </a:r>
+            <a:r>
+              <a:rPr lang="de-CH" sz="800" b="1" dirty="0">
+                <a:solidFill>
+                  <a:schemeClr val="tx1"/>
+                </a:solidFill>
+                <a:latin typeface="Arial" panose="020B0604020202020204" pitchFamily="34" charset="0"/>
+                <a:cs typeface="Arial" panose="020B0604020202020204" pitchFamily="34" charset="0"/>
+              </a:rPr>
+              <a:t> = 1, </a:t>
+            </a:r>
+            <a:r>
+              <a:rPr lang="de-CH" sz="800" b="1" dirty="0" err="1">
+                <a:solidFill>
+                  <a:schemeClr val="tx1"/>
+                </a:solidFill>
+                <a:latin typeface="Arial" panose="020B0604020202020204" pitchFamily="34" charset="0"/>
+                <a:cs typeface="Arial" panose="020B0604020202020204" pitchFamily="34" charset="0"/>
+              </a:rPr>
+              <a:t>edit_number</a:t>
+            </a:r>
+            <a:r>
+              <a:rPr lang="de-CH" sz="800" b="1" dirty="0">
+                <a:solidFill>
+                  <a:schemeClr val="tx1"/>
+                </a:solidFill>
+                <a:latin typeface="Arial" panose="020B0604020202020204" pitchFamily="34" charset="0"/>
+                <a:cs typeface="Arial" panose="020B0604020202020204" pitchFamily="34" charset="0"/>
+              </a:rPr>
+              <a:t>=1 </a:t>
+            </a:r>
+            <a:endParaRPr lang="de-CH" sz="1000" b="1" dirty="0">
+              <a:solidFill>
+                <a:schemeClr val="tx1"/>
+              </a:solidFill>
+              <a:latin typeface="Arial" panose="020B0604020202020204" pitchFamily="34" charset="0"/>
+              <a:cs typeface="Arial" panose="020B0604020202020204" pitchFamily="34" charset="0"/>
+            </a:endParaRPr>
+          </a:p>
+        </p:txBody>
+      </p:sp>
     </p:spTree>
     <p:extLst>
       <p:ext uri="{BB962C8B-B14F-4D97-AF65-F5344CB8AC3E}">
@@ -10205,152 +11216,6 @@
           <a:chExt cx="0" cy="0"/>
         </a:xfrm>
       </p:grpSpPr>
-      <p:sp>
-        <p:nvSpPr>
-          <p:cNvPr id="6" name="Rechteck 5">
-            <a:extLst>
-              <a:ext uri="{FF2B5EF4-FFF2-40B4-BE49-F238E27FC236}">
-                <a16:creationId xmlns:a16="http://schemas.microsoft.com/office/drawing/2014/main" id="{7BFE28AA-4A0F-4EBB-8D2E-316438E34FCC}"/>
-              </a:ext>
-            </a:extLst>
-          </p:cNvPr>
-          <p:cNvSpPr/>
-          <p:nvPr/>
-        </p:nvSpPr>
-        <p:spPr>
-          <a:xfrm>
-            <a:off x="1334094" y="3738239"/>
-            <a:ext cx="9523809" cy="952381"/>
-          </a:xfrm>
-          <a:prstGeom prst="rect">
-            <a:avLst/>
-          </a:prstGeom>
-          <a:solidFill>
-            <a:schemeClr val="tx1"/>
-          </a:solidFill>
-          <a:ln>
-            <a:solidFill>
-              <a:schemeClr val="tx1"/>
-            </a:solidFill>
-          </a:ln>
-        </p:spPr>
-        <p:style>
-          <a:lnRef idx="2">
-            <a:schemeClr val="accent1">
-              <a:shade val="50000"/>
-            </a:schemeClr>
-          </a:lnRef>
-          <a:fillRef idx="1">
-            <a:schemeClr val="accent1"/>
-          </a:fillRef>
-          <a:effectRef idx="0">
-            <a:schemeClr val="accent1"/>
-          </a:effectRef>
-          <a:fontRef idx="minor">
-            <a:schemeClr val="lt1"/>
-          </a:fontRef>
-        </p:style>
-        <p:txBody>
-          <a:bodyPr rtlCol="0" anchor="ctr"/>
-          <a:lstStyle/>
-          <a:p>
-            <a:pPr algn="ctr"/>
-            <a:endParaRPr lang="de-CH"/>
-          </a:p>
-        </p:txBody>
-      </p:sp>
-      <p:sp>
-        <p:nvSpPr>
-          <p:cNvPr id="7" name="Textfeld 6">
-            <a:extLst>
-              <a:ext uri="{FF2B5EF4-FFF2-40B4-BE49-F238E27FC236}">
-                <a16:creationId xmlns:a16="http://schemas.microsoft.com/office/drawing/2014/main" id="{5FB2D300-4E91-4D60-9500-869BED661DEE}"/>
-              </a:ext>
-            </a:extLst>
-          </p:cNvPr>
-          <p:cNvSpPr txBox="1"/>
-          <p:nvPr/>
-        </p:nvSpPr>
-        <p:spPr>
-          <a:xfrm>
-            <a:off x="1334094" y="4063458"/>
-            <a:ext cx="9523809" cy="646331"/>
-          </a:xfrm>
-          <a:prstGeom prst="rect">
-            <a:avLst/>
-          </a:prstGeom>
-          <a:noFill/>
-        </p:spPr>
-        <p:txBody>
-          <a:bodyPr wrap="square" rtlCol="0">
-            <a:spAutoFit/>
-          </a:bodyPr>
-          <a:lstStyle/>
-          <a:p>
-            <a:pPr algn="ctr"/>
-            <a:r>
-              <a:rPr lang="de-CH" sz="3600" b="1" dirty="0">
-                <a:solidFill>
-                  <a:srgbClr val="FF000A"/>
-                </a:solidFill>
-                <a:latin typeface="Arial" panose="020B0604020202020204" pitchFamily="34" charset="0"/>
-                <a:cs typeface="Arial" panose="020B0604020202020204" pitchFamily="34" charset="0"/>
-              </a:rPr>
-              <a:t>JAZZ </a:t>
-            </a:r>
-            <a:r>
-              <a:rPr lang="de-CH" sz="3600" b="1" i="1" dirty="0">
-                <a:solidFill>
-                  <a:srgbClr val="FF000A"/>
-                </a:solidFill>
-                <a:latin typeface="Arial" panose="020B0604020202020204" pitchFamily="34" charset="0"/>
-                <a:cs typeface="Arial" panose="020B0604020202020204" pitchFamily="34" charset="0"/>
-              </a:rPr>
-              <a:t>live</a:t>
-            </a:r>
-            <a:r>
-              <a:rPr lang="de-CH" sz="3600" b="1" dirty="0">
-                <a:solidFill>
-                  <a:srgbClr val="FF000A"/>
-                </a:solidFill>
-                <a:latin typeface="Arial" panose="020B0604020202020204" pitchFamily="34" charset="0"/>
-                <a:cs typeface="Arial" panose="020B0604020202020204" pitchFamily="34" charset="0"/>
-              </a:rPr>
-              <a:t> AARAU</a:t>
-            </a:r>
-          </a:p>
-        </p:txBody>
-      </p:sp>
-      <p:pic>
-        <p:nvPicPr>
-          <p:cNvPr id="8" name="Grafik 7">
-            <a:extLst>
-              <a:ext uri="{FF2B5EF4-FFF2-40B4-BE49-F238E27FC236}">
-                <a16:creationId xmlns:a16="http://schemas.microsoft.com/office/drawing/2014/main" id="{D4BA4C98-2EDA-479F-B41F-471279561263}"/>
-              </a:ext>
-            </a:extLst>
-          </p:cNvPr>
-          <p:cNvPicPr>
-            <a:picLocks noChangeAspect="1"/>
-          </p:cNvPicPr>
-          <p:nvPr/>
-        </p:nvPicPr>
-        <p:blipFill>
-          <a:blip r:embed="rId2"/>
-          <a:stretch>
-            <a:fillRect/>
-          </a:stretch>
-        </p:blipFill>
-        <p:spPr>
-          <a:xfrm>
-            <a:off x="2705095" y="5431535"/>
-            <a:ext cx="4572009" cy="452629"/>
-          </a:xfrm>
-          <a:prstGeom prst="rect">
-            <a:avLst/>
-          </a:prstGeom>
-        </p:spPr>
-      </p:pic>
     </p:spTree>
     <p:extLst>
       <p:ext uri="{BB962C8B-B14F-4D97-AF65-F5344CB8AC3E}">

</xml_diff>